<commit_message>
added new slides in Presentation
</commit_message>
<xml_diff>
--- a/Presentation.pptx
+++ b/Presentation.pptx
@@ -10,6 +10,9 @@
     <p:sldId id="259" r:id="rId4"/>
     <p:sldId id="258" r:id="rId5"/>
     <p:sldId id="260" r:id="rId6"/>
+    <p:sldId id="261" r:id="rId7"/>
+    <p:sldId id="262" r:id="rId8"/>
+    <p:sldId id="263" r:id="rId9"/>
   </p:sldIdLst>
   <p:sldSz cx="12192000" cy="6858000"/>
   <p:notesSz cx="6858000" cy="9144000"/>
@@ -285,7 +288,7 @@
           <a:p>
             <a:fld id="{76E42EAE-A2C4-49F9-84E9-DCB4B2CCF06C}" type="datetimeFigureOut">
               <a:rPr lang="en-IN" smtClean="0"/>
-              <a:t>16-11-2019</a:t>
+              <a:t>17-11-2019</a:t>
             </a:fld>
             <a:endParaRPr lang="en-IN"/>
           </a:p>
@@ -620,7 +623,7 @@
           <a:p>
             <a:fld id="{76E42EAE-A2C4-49F9-84E9-DCB4B2CCF06C}" type="datetimeFigureOut">
               <a:rPr lang="en-IN" smtClean="0"/>
-              <a:t>16-11-2019</a:t>
+              <a:t>17-11-2019</a:t>
             </a:fld>
             <a:endParaRPr lang="en-IN"/>
           </a:p>
@@ -800,7 +803,7 @@
           <a:p>
             <a:fld id="{76E42EAE-A2C4-49F9-84E9-DCB4B2CCF06C}" type="datetimeFigureOut">
               <a:rPr lang="en-IN" smtClean="0"/>
-              <a:t>16-11-2019</a:t>
+              <a:t>17-11-2019</a:t>
             </a:fld>
             <a:endParaRPr lang="en-IN"/>
           </a:p>
@@ -975,7 +978,7 @@
           <a:p>
             <a:fld id="{76E42EAE-A2C4-49F9-84E9-DCB4B2CCF06C}" type="datetimeFigureOut">
               <a:rPr lang="en-IN" smtClean="0"/>
-              <a:t>16-11-2019</a:t>
+              <a:t>17-11-2019</a:t>
             </a:fld>
             <a:endParaRPr lang="en-IN"/>
           </a:p>
@@ -1252,7 +1255,7 @@
           <a:p>
             <a:fld id="{76E42EAE-A2C4-49F9-84E9-DCB4B2CCF06C}" type="datetimeFigureOut">
               <a:rPr lang="en-IN" smtClean="0"/>
-              <a:t>16-11-2019</a:t>
+              <a:t>17-11-2019</a:t>
             </a:fld>
             <a:endParaRPr lang="en-IN"/>
           </a:p>
@@ -1651,7 +1654,7 @@
           <a:p>
             <a:fld id="{76E42EAE-A2C4-49F9-84E9-DCB4B2CCF06C}" type="datetimeFigureOut">
               <a:rPr lang="en-IN" smtClean="0"/>
-              <a:t>16-11-2019</a:t>
+              <a:t>17-11-2019</a:t>
             </a:fld>
             <a:endParaRPr lang="en-IN"/>
           </a:p>
@@ -2128,7 +2131,7 @@
           <a:p>
             <a:fld id="{76E42EAE-A2C4-49F9-84E9-DCB4B2CCF06C}" type="datetimeFigureOut">
               <a:rPr lang="en-IN" smtClean="0"/>
-              <a:t>16-11-2019</a:t>
+              <a:t>17-11-2019</a:t>
             </a:fld>
             <a:endParaRPr lang="en-IN"/>
           </a:p>
@@ -2246,7 +2249,7 @@
           <a:p>
             <a:fld id="{76E42EAE-A2C4-49F9-84E9-DCB4B2CCF06C}" type="datetimeFigureOut">
               <a:rPr lang="en-IN" smtClean="0"/>
-              <a:t>16-11-2019</a:t>
+              <a:t>17-11-2019</a:t>
             </a:fld>
             <a:endParaRPr lang="en-IN"/>
           </a:p>
@@ -2341,7 +2344,7 @@
           <a:p>
             <a:fld id="{76E42EAE-A2C4-49F9-84E9-DCB4B2CCF06C}" type="datetimeFigureOut">
               <a:rPr lang="en-IN" smtClean="0"/>
-              <a:t>16-11-2019</a:t>
+              <a:t>17-11-2019</a:t>
             </a:fld>
             <a:endParaRPr lang="en-IN"/>
           </a:p>
@@ -2687,7 +2690,7 @@
           <a:p>
             <a:fld id="{76E42EAE-A2C4-49F9-84E9-DCB4B2CCF06C}" type="datetimeFigureOut">
               <a:rPr lang="en-IN" smtClean="0"/>
-              <a:t>16-11-2019</a:t>
+              <a:t>17-11-2019</a:t>
             </a:fld>
             <a:endParaRPr lang="en-IN"/>
           </a:p>
@@ -3075,7 +3078,7 @@
           <a:p>
             <a:fld id="{76E42EAE-A2C4-49F9-84E9-DCB4B2CCF06C}" type="datetimeFigureOut">
               <a:rPr lang="en-IN" smtClean="0"/>
-              <a:t>16-11-2019</a:t>
+              <a:t>17-11-2019</a:t>
             </a:fld>
             <a:endParaRPr lang="en-IN"/>
           </a:p>
@@ -3353,7 +3356,7 @@
           <a:p>
             <a:fld id="{76E42EAE-A2C4-49F9-84E9-DCB4B2CCF06C}" type="datetimeFigureOut">
               <a:rPr lang="en-IN" smtClean="0"/>
-              <a:t>16-11-2019</a:t>
+              <a:t>17-11-2019</a:t>
             </a:fld>
             <a:endParaRPr lang="en-IN"/>
           </a:p>
@@ -4085,9 +4088,14 @@
           <a:p>
             <a:pPr algn="ctr"/>
             <a:r>
-              <a:rPr lang="en-IN" dirty="0"/>
+              <a:rPr lang="en-IN" sz="5400" dirty="0">
+                <a:latin typeface="Bahnschrift SemiBold SemiConden" panose="020B0502040204020203" pitchFamily="34" charset="0"/>
+              </a:rPr>
               <a:t>INTRODUCTION</a:t>
             </a:r>
+            <a:endParaRPr lang="en-IN" dirty="0">
+              <a:latin typeface="Bahnschrift SemiBold SemiConden" panose="020B0502040204020203" pitchFamily="34" charset="0"/>
+            </a:endParaRPr>
           </a:p>
         </p:txBody>
       </p:sp>
@@ -4448,17 +4456,25 @@
           <a:p>
             <a:pPr algn="ctr"/>
             <a:r>
-              <a:rPr lang="en-IN" sz="6000" dirty="0"/>
+              <a:rPr lang="en-IN" sz="6000" dirty="0">
+                <a:latin typeface="Bahnschrift SemiBold SemiConden" panose="020B0502040204020203" pitchFamily="34" charset="0"/>
+              </a:rPr>
               <a:t>Login</a:t>
             </a:r>
             <a:br>
-              <a:rPr lang="en-IN" sz="6000" dirty="0"/>
+              <a:rPr lang="en-IN" sz="6000" dirty="0">
+                <a:latin typeface="Bahnschrift SemiBold SemiConden" panose="020B0502040204020203" pitchFamily="34" charset="0"/>
+              </a:rPr>
             </a:br>
             <a:br>
-              <a:rPr lang="en-IN" sz="2000" dirty="0"/>
+              <a:rPr lang="en-IN" sz="2000" dirty="0">
+                <a:latin typeface="Bahnschrift SemiBold SemiConden" panose="020B0502040204020203" pitchFamily="34" charset="0"/>
+              </a:rPr>
             </a:br>
             <a:r>
-              <a:rPr lang="en-IN" sz="2800" dirty="0"/>
+              <a:rPr lang="en-IN" sz="2800" dirty="0">
+                <a:latin typeface="Bahnschrift SemiBold SemiConden" panose="020B0502040204020203" pitchFamily="34" charset="0"/>
+              </a:rPr>
               <a:t>(Login and Signup pages use the same theme)</a:t>
             </a:r>
           </a:p>
@@ -4595,49 +4611,528 @@
           <a:p>
             <a:pPr algn="ctr"/>
             <a:r>
-              <a:rPr lang="en-IN" sz="5400" dirty="0"/>
+              <a:rPr lang="en-IN" sz="5400" dirty="0">
+                <a:latin typeface="Bahnschrift SemiBold SemiConden" panose="020B0502040204020203" pitchFamily="34" charset="0"/>
+              </a:rPr>
               <a:t>HOME PAGE </a:t>
             </a:r>
             <a:br>
-              <a:rPr lang="en-IN" sz="5400" dirty="0"/>
+              <a:rPr lang="en-IN" sz="5400" dirty="0">
+                <a:latin typeface="Bahnschrift SemiBold SemiConden" panose="020B0502040204020203" pitchFamily="34" charset="0"/>
+              </a:rPr>
             </a:br>
             <a:r>
-              <a:rPr lang="en-IN" sz="2400" dirty="0"/>
-              <a:t>The homepage uses a different theme than the one used for Login/Signup. The rest of the webpages also follow this theme.</a:t>
-            </a:r>
-            <a:endParaRPr lang="en-IN" sz="5400" dirty="0"/>
-          </a:p>
-        </p:txBody>
-      </p:sp>
-      <p:sp>
-        <p:nvSpPr>
-          <p:cNvPr id="3" name="Content Placeholder 2">
+              <a:rPr lang="en-IN" sz="2400" dirty="0">
+                <a:latin typeface="Bahnschrift SemiBold SemiConden" panose="020B0502040204020203" pitchFamily="34" charset="0"/>
+              </a:rPr>
+              <a:t>The homepage uses a different theme than the one used for Login/Signup. The rest of the webpages also follow this theme, all having a common navigation bar made using CSS and Bootstrap</a:t>
+            </a:r>
+            <a:endParaRPr lang="en-IN" sz="5400" dirty="0">
+              <a:latin typeface="Bahnschrift SemiBold SemiConden" panose="020B0502040204020203" pitchFamily="34" charset="0"/>
+            </a:endParaRPr>
+          </a:p>
+        </p:txBody>
+      </p:sp>
+      <p:pic>
+        <p:nvPicPr>
+          <p:cNvPr id="9" name="Content Placeholder 8">
             <a:extLst>
               <a:ext uri="{FF2B5EF4-FFF2-40B4-BE49-F238E27FC236}">
-                <a16:creationId xmlns:a16="http://schemas.microsoft.com/office/drawing/2014/main" id="{1E6BC86A-FB05-4A06-92B6-FA8742C99251}"/>
+                <a16:creationId xmlns:a16="http://schemas.microsoft.com/office/drawing/2014/main" id="{9B402391-6112-46D4-A708-2ACEB13F2013}"/>
               </a:ext>
             </a:extLst>
           </p:cNvPr>
-          <p:cNvSpPr>
-            <a:spLocks noGrp="1"/>
-          </p:cNvSpPr>
+          <p:cNvPicPr>
+            <a:picLocks noGrp="1" noChangeAspect="1"/>
+          </p:cNvPicPr>
           <p:nvPr>
             <p:ph idx="1"/>
           </p:nvPr>
-        </p:nvSpPr>
-        <p:spPr/>
-        <p:txBody>
-          <a:bodyPr/>
-          <a:lstStyle/>
-          <a:p>
-            <a:endParaRPr lang="en-IN" dirty="0"/>
-          </a:p>
-        </p:txBody>
-      </p:sp>
+        </p:nvPicPr>
+        <p:blipFill>
+          <a:blip r:embed="rId2">
+            <a:extLst>
+              <a:ext uri="{28A0092B-C50C-407E-A947-70E740481C1C}">
+                <a14:useLocalDpi xmlns:a14="http://schemas.microsoft.com/office/drawing/2010/main" val="0"/>
+              </a:ext>
+            </a:extLst>
+          </a:blip>
+          <a:stretch>
+            <a:fillRect/>
+          </a:stretch>
+        </p:blipFill>
+        <p:spPr>
+          <a:xfrm>
+            <a:off x="2097625" y="2295525"/>
+            <a:ext cx="8492050" cy="4029075"/>
+          </a:xfrm>
+        </p:spPr>
+      </p:pic>
     </p:spTree>
     <p:extLst>
       <p:ext uri="{BB962C8B-B14F-4D97-AF65-F5344CB8AC3E}">
         <p14:creationId xmlns:p14="http://schemas.microsoft.com/office/powerpoint/2010/main" val="1677906298"/>
+      </p:ext>
+    </p:extLst>
+  </p:cSld>
+  <p:clrMapOvr>
+    <a:masterClrMapping/>
+  </p:clrMapOvr>
+</p:sld>
+</file>
+
+<file path=ppt/slides/slide6.xml><?xml version="1.0" encoding="utf-8"?>
+<p:sld xmlns:a="http://schemas.openxmlformats.org/drawingml/2006/main" xmlns:r="http://schemas.openxmlformats.org/officeDocument/2006/relationships" xmlns:p="http://schemas.openxmlformats.org/presentationml/2006/main">
+  <p:cSld>
+    <p:spTree>
+      <p:nvGrpSpPr>
+        <p:cNvPr id="1" name=""/>
+        <p:cNvGrpSpPr/>
+        <p:nvPr/>
+      </p:nvGrpSpPr>
+      <p:grpSpPr>
+        <a:xfrm>
+          <a:off x="0" y="0"/>
+          <a:ext cx="0" cy="0"/>
+          <a:chOff x="0" y="0"/>
+          <a:chExt cx="0" cy="0"/>
+        </a:xfrm>
+      </p:grpSpPr>
+      <p:sp>
+        <p:nvSpPr>
+          <p:cNvPr id="2" name="Title 1">
+            <a:extLst>
+              <a:ext uri="{FF2B5EF4-FFF2-40B4-BE49-F238E27FC236}">
+                <a16:creationId xmlns:a16="http://schemas.microsoft.com/office/drawing/2014/main" id="{F81C8B99-BB97-47F1-99FC-610BA0B45856}"/>
+              </a:ext>
+            </a:extLst>
+          </p:cNvPr>
+          <p:cNvSpPr>
+            <a:spLocks noGrp="1"/>
+          </p:cNvSpPr>
+          <p:nvPr>
+            <p:ph type="title"/>
+          </p:nvPr>
+        </p:nvSpPr>
+        <p:spPr>
+          <a:xfrm>
+            <a:off x="1371599" y="304800"/>
+            <a:ext cx="10125075" cy="1866900"/>
+          </a:xfrm>
+        </p:spPr>
+        <p:txBody>
+          <a:bodyPr>
+            <a:normAutofit/>
+          </a:bodyPr>
+          <a:lstStyle/>
+          <a:p>
+            <a:pPr algn="ctr"/>
+            <a:r>
+              <a:rPr lang="en-IN" sz="4800" dirty="0">
+                <a:latin typeface="Bahnschrift SemiCondensed" panose="020B0502040204020203" pitchFamily="34" charset="0"/>
+              </a:rPr>
+              <a:t>ABOUT/CONTACT US PAGE</a:t>
+            </a:r>
+            <a:br>
+              <a:rPr lang="en-IN" sz="4800" dirty="0">
+                <a:latin typeface="Bahnschrift SemiCondensed" panose="020B0502040204020203" pitchFamily="34" charset="0"/>
+              </a:rPr>
+            </a:br>
+            <a:r>
+              <a:rPr lang="en-IN" sz="1800" dirty="0">
+                <a:latin typeface="Bahnschrift SemiCondensed" panose="020B0502040204020203" pitchFamily="34" charset="0"/>
+              </a:rPr>
+              <a:t> </a:t>
+            </a:r>
+            <a:br>
+              <a:rPr lang="en-IN" sz="4800" dirty="0">
+                <a:latin typeface="Bahnschrift SemiCondensed" panose="020B0502040204020203" pitchFamily="34" charset="0"/>
+              </a:rPr>
+            </a:br>
+            <a:r>
+              <a:rPr lang="en-IN" sz="2400" dirty="0">
+                <a:latin typeface="Bahnschrift SemiCondensed" panose="020B0502040204020203" pitchFamily="34" charset="0"/>
+              </a:rPr>
+              <a:t>This page provides a brief description of the website and also has details of the makers(</a:t>
+            </a:r>
+            <a:r>
+              <a:rPr lang="en-IN" sz="2400" dirty="0" err="1">
+                <a:latin typeface="Bahnschrift SemiCondensed" panose="020B0502040204020203" pitchFamily="34" charset="0"/>
+              </a:rPr>
+              <a:t>i.e</a:t>
+            </a:r>
+            <a:r>
+              <a:rPr lang="en-IN" sz="2400" dirty="0">
+                <a:latin typeface="Bahnschrift SemiCondensed" panose="020B0502040204020203" pitchFamily="34" charset="0"/>
+              </a:rPr>
+              <a:t> team members) as profile cards </a:t>
+            </a:r>
+          </a:p>
+        </p:txBody>
+      </p:sp>
+      <p:pic>
+        <p:nvPicPr>
+          <p:cNvPr id="11" name="Content Placeholder 10">
+            <a:extLst>
+              <a:ext uri="{FF2B5EF4-FFF2-40B4-BE49-F238E27FC236}">
+                <a16:creationId xmlns:a16="http://schemas.microsoft.com/office/drawing/2014/main" id="{709BBE34-DAAE-4A7B-8AE7-F386B0F17471}"/>
+              </a:ext>
+            </a:extLst>
+          </p:cNvPr>
+          <p:cNvPicPr>
+            <a:picLocks noGrp="1" noChangeAspect="1"/>
+          </p:cNvPicPr>
+          <p:nvPr>
+            <p:ph idx="1"/>
+          </p:nvPr>
+        </p:nvPicPr>
+        <p:blipFill>
+          <a:blip r:embed="rId2">
+            <a:extLst>
+              <a:ext uri="{28A0092B-C50C-407E-A947-70E740481C1C}">
+                <a14:useLocalDpi xmlns:a14="http://schemas.microsoft.com/office/drawing/2010/main" val="0"/>
+              </a:ext>
+            </a:extLst>
+          </a:blip>
+          <a:stretch>
+            <a:fillRect/>
+          </a:stretch>
+        </p:blipFill>
+        <p:spPr>
+          <a:xfrm>
+            <a:off x="6619875" y="3429000"/>
+            <a:ext cx="5572125" cy="2657968"/>
+          </a:xfrm>
+        </p:spPr>
+      </p:pic>
+      <p:pic>
+        <p:nvPicPr>
+          <p:cNvPr id="13" name="Picture 12">
+            <a:extLst>
+              <a:ext uri="{FF2B5EF4-FFF2-40B4-BE49-F238E27FC236}">
+                <a16:creationId xmlns:a16="http://schemas.microsoft.com/office/drawing/2014/main" id="{F9E9AE7C-7697-4578-9515-55FF923791FD}"/>
+              </a:ext>
+            </a:extLst>
+          </p:cNvPr>
+          <p:cNvPicPr>
+            <a:picLocks noChangeAspect="1"/>
+          </p:cNvPicPr>
+          <p:nvPr/>
+        </p:nvPicPr>
+        <p:blipFill>
+          <a:blip r:embed="rId3">
+            <a:extLst>
+              <a:ext uri="{28A0092B-C50C-407E-A947-70E740481C1C}">
+                <a14:useLocalDpi xmlns:a14="http://schemas.microsoft.com/office/drawing/2010/main" val="0"/>
+              </a:ext>
+            </a:extLst>
+          </a:blip>
+          <a:stretch>
+            <a:fillRect/>
+          </a:stretch>
+        </p:blipFill>
+        <p:spPr>
+          <a:xfrm>
+            <a:off x="1038225" y="2363975"/>
+            <a:ext cx="5295900" cy="2322326"/>
+          </a:xfrm>
+          <a:prstGeom prst="rect">
+            <a:avLst/>
+          </a:prstGeom>
+        </p:spPr>
+      </p:pic>
+    </p:spTree>
+    <p:extLst>
+      <p:ext uri="{BB962C8B-B14F-4D97-AF65-F5344CB8AC3E}">
+        <p14:creationId xmlns:p14="http://schemas.microsoft.com/office/powerpoint/2010/main" val="2722397687"/>
+      </p:ext>
+    </p:extLst>
+  </p:cSld>
+  <p:clrMapOvr>
+    <a:masterClrMapping/>
+  </p:clrMapOvr>
+</p:sld>
+</file>
+
+<file path=ppt/slides/slide7.xml><?xml version="1.0" encoding="utf-8"?>
+<p:sld xmlns:a="http://schemas.openxmlformats.org/drawingml/2006/main" xmlns:r="http://schemas.openxmlformats.org/officeDocument/2006/relationships" xmlns:p="http://schemas.openxmlformats.org/presentationml/2006/main">
+  <p:cSld>
+    <p:spTree>
+      <p:nvGrpSpPr>
+        <p:cNvPr id="1" name=""/>
+        <p:cNvGrpSpPr/>
+        <p:nvPr/>
+      </p:nvGrpSpPr>
+      <p:grpSpPr>
+        <a:xfrm>
+          <a:off x="0" y="0"/>
+          <a:ext cx="0" cy="0"/>
+          <a:chOff x="0" y="0"/>
+          <a:chExt cx="0" cy="0"/>
+        </a:xfrm>
+      </p:grpSpPr>
+      <p:sp>
+        <p:nvSpPr>
+          <p:cNvPr id="2" name="Title 1">
+            <a:extLst>
+              <a:ext uri="{FF2B5EF4-FFF2-40B4-BE49-F238E27FC236}">
+                <a16:creationId xmlns:a16="http://schemas.microsoft.com/office/drawing/2014/main" id="{6A6C6ECF-4585-451B-8E22-FAFB59937248}"/>
+              </a:ext>
+            </a:extLst>
+          </p:cNvPr>
+          <p:cNvSpPr>
+            <a:spLocks noGrp="1"/>
+          </p:cNvSpPr>
+          <p:nvPr>
+            <p:ph type="title"/>
+          </p:nvPr>
+        </p:nvSpPr>
+        <p:spPr>
+          <a:xfrm>
+            <a:off x="1371600" y="152400"/>
+            <a:ext cx="10248900" cy="2019300"/>
+          </a:xfrm>
+        </p:spPr>
+        <p:txBody>
+          <a:bodyPr>
+            <a:normAutofit/>
+          </a:bodyPr>
+          <a:lstStyle/>
+          <a:p>
+            <a:pPr algn="ctr"/>
+            <a:r>
+              <a:rPr lang="en-IN" sz="5300" dirty="0">
+                <a:latin typeface="Bahnschrift SemiCondensed" panose="020B0502040204020203" pitchFamily="34" charset="0"/>
+              </a:rPr>
+              <a:t>HOST/EDIT/JOIN TOURNAMENTS</a:t>
+            </a:r>
+            <a:br>
+              <a:rPr lang="en-IN" dirty="0">
+                <a:latin typeface="Bahnschrift SemiCondensed" panose="020B0502040204020203" pitchFamily="34" charset="0"/>
+              </a:rPr>
+            </a:br>
+            <a:br>
+              <a:rPr lang="en-IN" sz="2400" dirty="0">
+                <a:latin typeface="Bahnschrift SemiCondensed" panose="020B0502040204020203" pitchFamily="34" charset="0"/>
+              </a:rPr>
+            </a:br>
+            <a:r>
+              <a:rPr lang="en-IN" sz="2400" dirty="0">
+                <a:latin typeface="Bahnschrift SemiCondensed" panose="020B0502040204020203" pitchFamily="34" charset="0"/>
+              </a:rPr>
+              <a:t>All these pages follow the same theme allowing the user to Host a tournament, Join a pre-existing tournament or update scores/rulebook using the Edit feature. </a:t>
+            </a:r>
+            <a:endParaRPr lang="en-IN" dirty="0">
+              <a:latin typeface="Bahnschrift SemiCondensed" panose="020B0502040204020203" pitchFamily="34" charset="0"/>
+            </a:endParaRPr>
+          </a:p>
+        </p:txBody>
+      </p:sp>
+      <p:pic>
+        <p:nvPicPr>
+          <p:cNvPr id="5" name="Content Placeholder 4">
+            <a:extLst>
+              <a:ext uri="{FF2B5EF4-FFF2-40B4-BE49-F238E27FC236}">
+                <a16:creationId xmlns:a16="http://schemas.microsoft.com/office/drawing/2014/main" id="{F949AF12-B324-4B95-8E0C-E4AD4BE2498A}"/>
+              </a:ext>
+            </a:extLst>
+          </p:cNvPr>
+          <p:cNvPicPr>
+            <a:picLocks noGrp="1" noChangeAspect="1"/>
+          </p:cNvPicPr>
+          <p:nvPr>
+            <p:ph idx="1"/>
+          </p:nvPr>
+        </p:nvPicPr>
+        <p:blipFill>
+          <a:blip r:embed="rId2">
+            <a:extLst>
+              <a:ext uri="{28A0092B-C50C-407E-A947-70E740481C1C}">
+                <a14:useLocalDpi xmlns:a14="http://schemas.microsoft.com/office/drawing/2010/main" val="0"/>
+              </a:ext>
+            </a:extLst>
+          </a:blip>
+          <a:stretch>
+            <a:fillRect/>
+          </a:stretch>
+        </p:blipFill>
+        <p:spPr>
+          <a:xfrm>
+            <a:off x="3971751" y="2171700"/>
+            <a:ext cx="5048597" cy="2838450"/>
+          </a:xfrm>
+        </p:spPr>
+      </p:pic>
+      <p:sp>
+        <p:nvSpPr>
+          <p:cNvPr id="6" name="TextBox 5">
+            <a:extLst>
+              <a:ext uri="{FF2B5EF4-FFF2-40B4-BE49-F238E27FC236}">
+                <a16:creationId xmlns:a16="http://schemas.microsoft.com/office/drawing/2014/main" id="{807760E6-3117-41AA-831D-278B38DBD63A}"/>
+              </a:ext>
+            </a:extLst>
+          </p:cNvPr>
+          <p:cNvSpPr txBox="1"/>
+          <p:nvPr/>
+        </p:nvSpPr>
+        <p:spPr>
+          <a:xfrm>
+            <a:off x="1371601" y="5200560"/>
+            <a:ext cx="10248899" cy="1200329"/>
+          </a:xfrm>
+          <a:prstGeom prst="rect">
+            <a:avLst/>
+          </a:prstGeom>
+          <a:noFill/>
+        </p:spPr>
+        <p:txBody>
+          <a:bodyPr wrap="square" rtlCol="0">
+            <a:spAutoFit/>
+          </a:bodyPr>
+          <a:lstStyle/>
+          <a:p>
+            <a:pPr algn="ctr"/>
+            <a:r>
+              <a:rPr lang="en-IN" b="1" dirty="0"/>
+              <a:t>Host Tournament</a:t>
+            </a:r>
+          </a:p>
+          <a:p>
+            <a:pPr algn="ctr"/>
+            <a:endParaRPr lang="en-IN" b="1" dirty="0"/>
+          </a:p>
+          <a:p>
+            <a:pPr algn="just"/>
+            <a:r>
+              <a:rPr lang="en-IN" dirty="0"/>
+              <a:t>When the user enters all details and clicks on “GO”, a new record is created in our database which stores the details of the tournament. This is then reflected in the calendar displayed on the Home Page.</a:t>
+            </a:r>
+          </a:p>
+        </p:txBody>
+      </p:sp>
+    </p:spTree>
+    <p:extLst>
+      <p:ext uri="{BB962C8B-B14F-4D97-AF65-F5344CB8AC3E}">
+        <p14:creationId xmlns:p14="http://schemas.microsoft.com/office/powerpoint/2010/main" val="1715699734"/>
+      </p:ext>
+    </p:extLst>
+  </p:cSld>
+  <p:clrMapOvr>
+    <a:masterClrMapping/>
+  </p:clrMapOvr>
+</p:sld>
+</file>
+
+<file path=ppt/slides/slide8.xml><?xml version="1.0" encoding="utf-8"?>
+<p:sld xmlns:a="http://schemas.openxmlformats.org/drawingml/2006/main" xmlns:r="http://schemas.openxmlformats.org/officeDocument/2006/relationships" xmlns:p="http://schemas.openxmlformats.org/presentationml/2006/main">
+  <p:cSld>
+    <p:spTree>
+      <p:nvGrpSpPr>
+        <p:cNvPr id="1" name=""/>
+        <p:cNvGrpSpPr/>
+        <p:nvPr/>
+      </p:nvGrpSpPr>
+      <p:grpSpPr>
+        <a:xfrm>
+          <a:off x="0" y="0"/>
+          <a:ext cx="0" cy="0"/>
+          <a:chOff x="0" y="0"/>
+          <a:chExt cx="0" cy="0"/>
+        </a:xfrm>
+      </p:grpSpPr>
+      <p:sp>
+        <p:nvSpPr>
+          <p:cNvPr id="2" name="Title 1">
+            <a:extLst>
+              <a:ext uri="{FF2B5EF4-FFF2-40B4-BE49-F238E27FC236}">
+                <a16:creationId xmlns:a16="http://schemas.microsoft.com/office/drawing/2014/main" id="{468BC246-1A80-4BE6-B21C-E2486C6DA6F8}"/>
+              </a:ext>
+            </a:extLst>
+          </p:cNvPr>
+          <p:cNvSpPr>
+            <a:spLocks noGrp="1"/>
+          </p:cNvSpPr>
+          <p:nvPr>
+            <p:ph type="title"/>
+          </p:nvPr>
+        </p:nvSpPr>
+        <p:spPr/>
+        <p:txBody>
+          <a:bodyPr/>
+          <a:lstStyle/>
+          <a:p>
+            <a:pPr algn="ctr"/>
+            <a:r>
+              <a:rPr lang="en-IN" sz="6600" dirty="0">
+                <a:latin typeface="Bahnschrift SemiBold SemiConden" panose="020B0502040204020203" pitchFamily="34" charset="0"/>
+              </a:rPr>
+              <a:t>BACK-END</a:t>
+            </a:r>
+            <a:endParaRPr lang="en-IN" dirty="0"/>
+          </a:p>
+        </p:txBody>
+      </p:sp>
+      <p:sp>
+        <p:nvSpPr>
+          <p:cNvPr id="3" name="Content Placeholder 2">
+            <a:extLst>
+              <a:ext uri="{FF2B5EF4-FFF2-40B4-BE49-F238E27FC236}">
+                <a16:creationId xmlns:a16="http://schemas.microsoft.com/office/drawing/2014/main" id="{815755FD-741A-4C26-B010-6D15336A54A3}"/>
+              </a:ext>
+            </a:extLst>
+          </p:cNvPr>
+          <p:cNvSpPr>
+            <a:spLocks noGrp="1"/>
+          </p:cNvSpPr>
+          <p:nvPr>
+            <p:ph idx="1"/>
+          </p:nvPr>
+        </p:nvSpPr>
+        <p:spPr/>
+        <p:txBody>
+          <a:bodyPr/>
+          <a:lstStyle/>
+          <a:p>
+            <a:pPr marL="0" indent="0">
+              <a:buNone/>
+            </a:pPr>
+            <a:r>
+              <a:rPr lang="en-IN" dirty="0"/>
+              <a:t>The backend has been made predominantly using PHP. The database used to store data, whether it is user data or the tournaments is SQL. We’ve also used Apache to set up the server.</a:t>
+            </a:r>
+          </a:p>
+          <a:p>
+            <a:pPr marL="0" indent="0">
+              <a:buNone/>
+            </a:pPr>
+            <a:r>
+              <a:rPr lang="en-IN" dirty="0"/>
+              <a:t>A significant amount of JavaScript has also been used for the backend.</a:t>
+            </a:r>
+          </a:p>
+          <a:p>
+            <a:pPr marL="0" indent="0">
+              <a:buNone/>
+            </a:pPr>
+            <a:r>
+              <a:rPr lang="en-IN" dirty="0"/>
+              <a:t>To enable the ‘Edit Tournament’ feature, we’re making use of HTML5 </a:t>
+            </a:r>
+            <a:r>
+              <a:rPr lang="en-IN" dirty="0" err="1"/>
+              <a:t>LocalStorage</a:t>
+            </a:r>
+            <a:r>
+              <a:rPr lang="en-IN" dirty="0"/>
+              <a:t> to store the updated scores.</a:t>
+            </a:r>
+          </a:p>
+        </p:txBody>
+      </p:sp>
+    </p:spTree>
+    <p:extLst>
+      <p:ext uri="{BB962C8B-B14F-4D97-AF65-F5344CB8AC3E}">
+        <p14:creationId xmlns:p14="http://schemas.microsoft.com/office/powerpoint/2010/main" val="492432126"/>
       </p:ext>
     </p:extLst>
   </p:cSld>

</xml_diff>